<commit_message>
Added a period on slide 5
</commit_message>
<xml_diff>
--- a/Class-1/Python For Everyone.pptx
+++ b/Class-1/Python For Everyone.pptx
@@ -300,7 +300,7 @@
           <a:p>
             <a:fld id="{3A8AB521-9182-4012-B86B-65B8484C7DE3}" type="datetimeFigureOut">
               <a:rPr lang="en-US" smtClean="0"/>
-              <a:t>1/29/2025</a:t>
+              <a:t>1/25/26</a:t>
             </a:fld>
             <a:endParaRPr lang="en-US"/>
           </a:p>
@@ -567,7 +567,7 @@
           <a:p>
             <a:fld id="{3A8AB521-9182-4012-B86B-65B8484C7DE3}" type="datetimeFigureOut">
               <a:rPr lang="en-US" smtClean="0"/>
-              <a:t>1/29/2025</a:t>
+              <a:t>1/25/26</a:t>
             </a:fld>
             <a:endParaRPr lang="en-US"/>
           </a:p>
@@ -798,7 +798,7 @@
           <a:p>
             <a:fld id="{3A8AB521-9182-4012-B86B-65B8484C7DE3}" type="datetimeFigureOut">
               <a:rPr lang="en-US" smtClean="0"/>
-              <a:t>1/29/2025</a:t>
+              <a:t>1/25/26</a:t>
             </a:fld>
             <a:endParaRPr lang="en-US"/>
           </a:p>
@@ -1108,7 +1108,7 @@
           <a:p>
             <a:fld id="{3A8AB521-9182-4012-B86B-65B8484C7DE3}" type="datetimeFigureOut">
               <a:rPr lang="en-US" smtClean="0"/>
-              <a:t>1/29/2025</a:t>
+              <a:t>1/25/26</a:t>
             </a:fld>
             <a:endParaRPr lang="en-US"/>
           </a:p>
@@ -1581,7 +1581,7 @@
           <a:p>
             <a:fld id="{3A8AB521-9182-4012-B86B-65B8484C7DE3}" type="datetimeFigureOut">
               <a:rPr lang="en-US" smtClean="0"/>
-              <a:t>1/29/2025</a:t>
+              <a:t>1/25/26</a:t>
             </a:fld>
             <a:endParaRPr lang="en-US"/>
           </a:p>
@@ -2128,7 +2128,7 @@
           <a:p>
             <a:fld id="{3A8AB521-9182-4012-B86B-65B8484C7DE3}" type="datetimeFigureOut">
               <a:rPr lang="en-US" smtClean="0"/>
-              <a:t>1/29/2025</a:t>
+              <a:t>1/25/26</a:t>
             </a:fld>
             <a:endParaRPr lang="en-US"/>
           </a:p>
@@ -2902,7 +2902,7 @@
           <a:p>
             <a:fld id="{3A8AB521-9182-4012-B86B-65B8484C7DE3}" type="datetimeFigureOut">
               <a:rPr lang="en-US" smtClean="0"/>
-              <a:t>1/29/2025</a:t>
+              <a:t>1/25/26</a:t>
             </a:fld>
             <a:endParaRPr lang="en-US"/>
           </a:p>
@@ -3077,7 +3077,7 @@
           <a:p>
             <a:fld id="{3A8AB521-9182-4012-B86B-65B8484C7DE3}" type="datetimeFigureOut">
               <a:rPr lang="en-US" smtClean="0"/>
-              <a:t>1/29/2025</a:t>
+              <a:t>1/25/26</a:t>
             </a:fld>
             <a:endParaRPr lang="en-US"/>
           </a:p>
@@ -3300,7 +3300,7 @@
           <a:p>
             <a:fld id="{3A8AB521-9182-4012-B86B-65B8484C7DE3}" type="datetimeFigureOut">
               <a:rPr lang="en-US" smtClean="0"/>
-              <a:t>1/29/2025</a:t>
+              <a:t>1/25/26</a:t>
             </a:fld>
             <a:endParaRPr lang="en-US"/>
           </a:p>
@@ -3480,7 +3480,7 @@
           <a:p>
             <a:fld id="{3A8AB521-9182-4012-B86B-65B8484C7DE3}" type="datetimeFigureOut">
               <a:rPr lang="en-US" smtClean="0"/>
-              <a:t>1/29/2025</a:t>
+              <a:t>1/25/26</a:t>
             </a:fld>
             <a:endParaRPr lang="en-US"/>
           </a:p>
@@ -3769,7 +3769,7 @@
           <a:p>
             <a:fld id="{3A8AB521-9182-4012-B86B-65B8484C7DE3}" type="datetimeFigureOut">
               <a:rPr lang="en-US" smtClean="0"/>
-              <a:t>1/29/2025</a:t>
+              <a:t>1/25/26</a:t>
             </a:fld>
             <a:endParaRPr lang="en-US"/>
           </a:p>
@@ -4011,7 +4011,7 @@
           <a:p>
             <a:fld id="{3A8AB521-9182-4012-B86B-65B8484C7DE3}" type="datetimeFigureOut">
               <a:rPr lang="en-US" smtClean="0"/>
-              <a:t>1/29/2025</a:t>
+              <a:t>1/25/26</a:t>
             </a:fld>
             <a:endParaRPr lang="en-US"/>
           </a:p>
@@ -4390,7 +4390,7 @@
           <a:p>
             <a:fld id="{3A8AB521-9182-4012-B86B-65B8484C7DE3}" type="datetimeFigureOut">
               <a:rPr lang="en-US" smtClean="0"/>
-              <a:t>1/29/2025</a:t>
+              <a:t>1/25/26</a:t>
             </a:fld>
             <a:endParaRPr lang="en-US"/>
           </a:p>
@@ -4508,7 +4508,7 @@
           <a:p>
             <a:fld id="{3A8AB521-9182-4012-B86B-65B8484C7DE3}" type="datetimeFigureOut">
               <a:rPr lang="en-US" smtClean="0"/>
-              <a:t>1/29/2025</a:t>
+              <a:t>1/25/26</a:t>
             </a:fld>
             <a:endParaRPr lang="en-US"/>
           </a:p>
@@ -4603,7 +4603,7 @@
           <a:p>
             <a:fld id="{3A8AB521-9182-4012-B86B-65B8484C7DE3}" type="datetimeFigureOut">
               <a:rPr lang="en-US" smtClean="0"/>
-              <a:t>1/29/2025</a:t>
+              <a:t>1/25/26</a:t>
             </a:fld>
             <a:endParaRPr lang="en-US"/>
           </a:p>
@@ -4852,7 +4852,7 @@
           <a:p>
             <a:fld id="{3A8AB521-9182-4012-B86B-65B8484C7DE3}" type="datetimeFigureOut">
               <a:rPr lang="en-US" smtClean="0"/>
-              <a:t>1/29/2025</a:t>
+              <a:t>1/25/26</a:t>
             </a:fld>
             <a:endParaRPr lang="en-US"/>
           </a:p>
@@ -5109,7 +5109,7 @@
           <a:p>
             <a:fld id="{3A8AB521-9182-4012-B86B-65B8484C7DE3}" type="datetimeFigureOut">
               <a:rPr lang="en-US" smtClean="0"/>
-              <a:t>1/29/2025</a:t>
+              <a:t>1/25/26</a:t>
             </a:fld>
             <a:endParaRPr lang="en-US"/>
           </a:p>
@@ -5352,7 +5352,7 @@
           <a:p>
             <a:fld id="{3A8AB521-9182-4012-B86B-65B8484C7DE3}" type="datetimeFigureOut">
               <a:rPr lang="en-US" smtClean="0"/>
-              <a:t>1/29/2025</a:t>
+              <a:t>1/25/26</a:t>
             </a:fld>
             <a:endParaRPr lang="en-US"/>
           </a:p>
@@ -9440,7 +9440,7 @@
           <a:p>
             <a:r>
               <a:rPr lang="en-US" dirty="0"/>
-              <a:t>These slides are in that folder</a:t>
+              <a:t>These slides are in that folder.</a:t>
             </a:r>
           </a:p>
           <a:p>

</xml_diff>